<commit_message>
Update TimerLab gif pptx to use same color palette
</commit_message>
<xml_diff>
--- a/doc/TimerLab gif.pptx
+++ b/doc/TimerLab gif.pptx
@@ -306,7 +306,7 @@
           <a:p>
             <a:fld id="{1C243D36-5217-48BF-A097-7AA0FC8B35E5}" type="datetimeFigureOut">
               <a:rPr lang="en-US" smtClean="0"/>
-              <a:t>6/27/2017</a:t>
+              <a:t>6/30/2017</a:t>
             </a:fld>
             <a:endParaRPr lang="en-US"/>
           </a:p>
@@ -474,7 +474,7 @@
           <a:p>
             <a:fld id="{1C243D36-5217-48BF-A097-7AA0FC8B35E5}" type="datetimeFigureOut">
               <a:rPr lang="en-US" smtClean="0"/>
-              <a:t>6/27/2017</a:t>
+              <a:t>6/30/2017</a:t>
             </a:fld>
             <a:endParaRPr lang="en-US"/>
           </a:p>
@@ -652,7 +652,7 @@
           <a:p>
             <a:fld id="{1C243D36-5217-48BF-A097-7AA0FC8B35E5}" type="datetimeFigureOut">
               <a:rPr lang="en-US" smtClean="0"/>
-              <a:t>6/27/2017</a:t>
+              <a:t>6/30/2017</a:t>
             </a:fld>
             <a:endParaRPr lang="en-US"/>
           </a:p>
@@ -820,7 +820,7 @@
           <a:p>
             <a:fld id="{1C243D36-5217-48BF-A097-7AA0FC8B35E5}" type="datetimeFigureOut">
               <a:rPr lang="en-US" smtClean="0"/>
-              <a:t>6/27/2017</a:t>
+              <a:t>6/30/2017</a:t>
             </a:fld>
             <a:endParaRPr lang="en-US"/>
           </a:p>
@@ -1065,7 +1065,7 @@
           <a:p>
             <a:fld id="{1C243D36-5217-48BF-A097-7AA0FC8B35E5}" type="datetimeFigureOut">
               <a:rPr lang="en-US" smtClean="0"/>
-              <a:t>6/27/2017</a:t>
+              <a:t>6/30/2017</a:t>
             </a:fld>
             <a:endParaRPr lang="en-US"/>
           </a:p>
@@ -1350,7 +1350,7 @@
           <a:p>
             <a:fld id="{1C243D36-5217-48BF-A097-7AA0FC8B35E5}" type="datetimeFigureOut">
               <a:rPr lang="en-US" smtClean="0"/>
-              <a:t>6/27/2017</a:t>
+              <a:t>6/30/2017</a:t>
             </a:fld>
             <a:endParaRPr lang="en-US"/>
           </a:p>
@@ -1774,7 +1774,7 @@
           <a:p>
             <a:fld id="{1C243D36-5217-48BF-A097-7AA0FC8B35E5}" type="datetimeFigureOut">
               <a:rPr lang="en-US" smtClean="0"/>
-              <a:t>6/27/2017</a:t>
+              <a:t>6/30/2017</a:t>
             </a:fld>
             <a:endParaRPr lang="en-US"/>
           </a:p>
@@ -1891,7 +1891,7 @@
           <a:p>
             <a:fld id="{1C243D36-5217-48BF-A097-7AA0FC8B35E5}" type="datetimeFigureOut">
               <a:rPr lang="en-US" smtClean="0"/>
-              <a:t>6/27/2017</a:t>
+              <a:t>6/30/2017</a:t>
             </a:fld>
             <a:endParaRPr lang="en-US"/>
           </a:p>
@@ -1986,7 +1986,7 @@
           <a:p>
             <a:fld id="{1C243D36-5217-48BF-A097-7AA0FC8B35E5}" type="datetimeFigureOut">
               <a:rPr lang="en-US" smtClean="0"/>
-              <a:t>6/27/2017</a:t>
+              <a:t>6/30/2017</a:t>
             </a:fld>
             <a:endParaRPr lang="en-US"/>
           </a:p>
@@ -2261,7 +2261,7 @@
           <a:p>
             <a:fld id="{1C243D36-5217-48BF-A097-7AA0FC8B35E5}" type="datetimeFigureOut">
               <a:rPr lang="en-US" smtClean="0"/>
-              <a:t>6/27/2017</a:t>
+              <a:t>6/30/2017</a:t>
             </a:fld>
             <a:endParaRPr lang="en-US"/>
           </a:p>
@@ -2513,7 +2513,7 @@
           <a:p>
             <a:fld id="{1C243D36-5217-48BF-A097-7AA0FC8B35E5}" type="datetimeFigureOut">
               <a:rPr lang="en-US" smtClean="0"/>
-              <a:t>6/27/2017</a:t>
+              <a:t>6/30/2017</a:t>
             </a:fld>
             <a:endParaRPr lang="en-US"/>
           </a:p>
@@ -2727,7 +2727,7 @@
           <a:p>
             <a:fld id="{1C243D36-5217-48BF-A097-7AA0FC8B35E5}" type="datetimeFigureOut">
               <a:rPr lang="en-US" smtClean="0"/>
-              <a:t>6/27/2017</a:t>
+              <a:t>6/30/2017</a:t>
             </a:fld>
             <a:endParaRPr lang="en-US"/>
           </a:p>
@@ -3211,15 +3211,11 @@
             <a:avLst/>
           </a:prstGeom>
           <a:solidFill>
-            <a:schemeClr val="accent5">
-              <a:lumMod val="75000"/>
-            </a:schemeClr>
+            <a:srgbClr val="95B3D7"/>
           </a:solidFill>
           <a:ln>
             <a:solidFill>
-              <a:schemeClr val="accent5">
-                <a:lumMod val="75000"/>
-              </a:schemeClr>
+              <a:srgbClr val="95B3D7"/>
             </a:solidFill>
           </a:ln>
         </p:spPr>
@@ -3298,10 +3294,7 @@
             </a:prstGeom>
             <a:ln w="25400">
               <a:solidFill>
-                <a:schemeClr val="accent1">
-                  <a:lumMod val="60000"/>
-                  <a:lumOff val="40000"/>
-                </a:schemeClr>
+                <a:srgbClr val="558ED5"/>
               </a:solidFill>
             </a:ln>
           </p:spPr>
@@ -3346,10 +3339,7 @@
             </a:prstGeom>
             <a:ln w="25400">
               <a:solidFill>
-                <a:schemeClr val="accent1">
-                  <a:lumMod val="60000"/>
-                  <a:lumOff val="40000"/>
-                </a:schemeClr>
+                <a:srgbClr val="558ED5"/>
               </a:solidFill>
             </a:ln>
           </p:spPr>
@@ -3394,10 +3384,7 @@
             </a:prstGeom>
             <a:ln w="25400">
               <a:solidFill>
-                <a:schemeClr val="accent1">
-                  <a:lumMod val="60000"/>
-                  <a:lumOff val="40000"/>
-                </a:schemeClr>
+                <a:srgbClr val="558ED5"/>
               </a:solidFill>
             </a:ln>
           </p:spPr>
@@ -3442,10 +3429,7 @@
             </a:prstGeom>
             <a:ln w="25400">
               <a:solidFill>
-                <a:schemeClr val="accent1">
-                  <a:lumMod val="60000"/>
-                  <a:lumOff val="40000"/>
-                </a:schemeClr>
+                <a:srgbClr val="558ED5"/>
               </a:solidFill>
             </a:ln>
           </p:spPr>
@@ -3490,10 +3474,7 @@
             </a:prstGeom>
             <a:ln w="25400">
               <a:solidFill>
-                <a:schemeClr val="accent1">
-                  <a:lumMod val="60000"/>
-                  <a:lumOff val="40000"/>
-                </a:schemeClr>
+                <a:srgbClr val="558ED5"/>
               </a:solidFill>
             </a:ln>
           </p:spPr>
@@ -4081,9 +4062,7 @@
             <a:avLst/>
           </a:prstGeom>
           <a:solidFill>
-            <a:schemeClr val="accent5">
-              <a:lumMod val="50000"/>
-            </a:schemeClr>
+            <a:srgbClr val="0070C0"/>
           </a:solidFill>
           <a:ln w="25400" cap="flat" cmpd="sng" algn="ctr">
             <a:solidFill>
@@ -4148,9 +4127,7 @@
             <a:avLst/>
           </a:prstGeom>
           <a:solidFill>
-            <a:schemeClr val="accent5">
-              <a:lumMod val="50000"/>
-            </a:schemeClr>
+            <a:srgbClr val="0070C0"/>
           </a:solidFill>
           <a:ln w="25400" cap="flat" cmpd="sng" algn="ctr">
             <a:solidFill>

</xml_diff>